<commit_message>
Added various Rmarkdowns for the past few lectures. Added wrap-up lecture slides. Added course project.
</commit_message>
<xml_diff>
--- a/docs/presentations/data_transformations.pptx
+++ b/docs/presentations/data_transformations.pptx
@@ -29,8 +29,8 @@
     <p:sldId id="269" r:id="rId20"/>
     <p:sldId id="277" r:id="rId21"/>
     <p:sldId id="263" r:id="rId22"/>
-    <p:sldId id="284" r:id="rId23"/>
-    <p:sldId id="265" r:id="rId24"/>
+    <p:sldId id="265" r:id="rId23"/>
+    <p:sldId id="284" r:id="rId24"/>
     <p:sldId id="283" r:id="rId25"/>
     <p:sldId id="266" r:id="rId26"/>
     <p:sldId id="267" r:id="rId27"/>
@@ -250,7 +250,7 @@
           <a:p>
             <a:fld id="{BF052239-6C6F-472F-B175-F0FADCEE2BD3}" type="datetimeFigureOut">
               <a:rPr lang="en-US" smtClean="0"/>
-              <a:t>4/23/2020</a:t>
+              <a:t>4/24/2020</a:t>
             </a:fld>
             <a:endParaRPr lang="en-US"/>
           </a:p>
@@ -648,6 +648,90 @@
           <a:bodyPr/>
           <a:lstStyle/>
           <a:p>
+            <a:endParaRPr lang="en-GB" dirty="0"/>
+          </a:p>
+        </p:txBody>
+      </p:sp>
+      <p:sp>
+        <p:nvSpPr>
+          <p:cNvPr id="4" name="Slide Number Placeholder 3"/>
+          <p:cNvSpPr>
+            <a:spLocks noGrp="1"/>
+          </p:cNvSpPr>
+          <p:nvPr>
+            <p:ph type="sldNum" sz="quarter" idx="5"/>
+          </p:nvPr>
+        </p:nvSpPr>
+        <p:spPr/>
+        <p:txBody>
+          <a:bodyPr/>
+          <a:lstStyle/>
+          <a:p>
+            <a:fld id="{E4FF5570-FE69-4FDF-99DA-8CDE436443CD}" type="slidenum">
+              <a:rPr lang="en-US" smtClean="0"/>
+              <a:t>10</a:t>
+            </a:fld>
+            <a:endParaRPr lang="en-US"/>
+          </a:p>
+        </p:txBody>
+      </p:sp>
+    </p:spTree>
+    <p:extLst>
+      <p:ext uri="{BB962C8B-B14F-4D97-AF65-F5344CB8AC3E}">
+        <p14:creationId xmlns:p14="http://schemas.microsoft.com/office/powerpoint/2010/main" val="1109835875"/>
+      </p:ext>
+    </p:extLst>
+  </p:cSld>
+  <p:clrMapOvr>
+    <a:masterClrMapping/>
+  </p:clrMapOvr>
+</p:notes>
+</file>
+
+<file path=ppt/notesSlides/notesSlide3.xml><?xml version="1.0" encoding="utf-8"?>
+<p:notes xmlns:a="http://schemas.openxmlformats.org/drawingml/2006/main" xmlns:r="http://schemas.openxmlformats.org/officeDocument/2006/relationships" xmlns:p="http://schemas.openxmlformats.org/presentationml/2006/main">
+  <p:cSld>
+    <p:spTree>
+      <p:nvGrpSpPr>
+        <p:cNvPr id="1" name=""/>
+        <p:cNvGrpSpPr/>
+        <p:nvPr/>
+      </p:nvGrpSpPr>
+      <p:grpSpPr>
+        <a:xfrm>
+          <a:off x="0" y="0"/>
+          <a:ext cx="0" cy="0"/>
+          <a:chOff x="0" y="0"/>
+          <a:chExt cx="0" cy="0"/>
+        </a:xfrm>
+      </p:grpSpPr>
+      <p:sp>
+        <p:nvSpPr>
+          <p:cNvPr id="2" name="Slide Image Placeholder 1"/>
+          <p:cNvSpPr>
+            <a:spLocks noGrp="1" noRot="1" noChangeAspect="1"/>
+          </p:cNvSpPr>
+          <p:nvPr>
+            <p:ph type="sldImg"/>
+          </p:nvPr>
+        </p:nvSpPr>
+        <p:spPr/>
+      </p:sp>
+      <p:sp>
+        <p:nvSpPr>
+          <p:cNvPr id="3" name="Notes Placeholder 2"/>
+          <p:cNvSpPr>
+            <a:spLocks noGrp="1"/>
+          </p:cNvSpPr>
+          <p:nvPr>
+            <p:ph type="body" idx="1"/>
+          </p:nvPr>
+        </p:nvSpPr>
+        <p:spPr/>
+        <p:txBody>
+          <a:bodyPr/>
+          <a:lstStyle/>
+          <a:p>
             <a:r>
               <a:rPr lang="en-GB"/>
               <a:t>Even if you work alone, it is useful, and it can also be used for text files, e.g. if you use markdown/</a:t>
@@ -763,7 +847,7 @@
 </p:notes>
 </file>
 
-<file path=ppt/notesSlides/notesSlide3.xml><?xml version="1.0" encoding="utf-8"?>
+<file path=ppt/notesSlides/notesSlide4.xml><?xml version="1.0" encoding="utf-8"?>
 <p:notes xmlns:a="http://schemas.openxmlformats.org/drawingml/2006/main" xmlns:r="http://schemas.openxmlformats.org/officeDocument/2006/relationships" xmlns:p="http://schemas.openxmlformats.org/presentationml/2006/main">
   <p:cSld>
     <p:spTree>
@@ -1026,7 +1110,7 @@
           <a:p>
             <a:fld id="{69F42ADB-7D30-4CDA-A166-333DE990463F}" type="datetimeFigureOut">
               <a:rPr lang="en-US" smtClean="0"/>
-              <a:t>4/23/2020</a:t>
+              <a:t>4/24/2020</a:t>
             </a:fld>
             <a:endParaRPr lang="en-US"/>
           </a:p>
@@ -1194,7 +1278,7 @@
           <a:p>
             <a:fld id="{69F42ADB-7D30-4CDA-A166-333DE990463F}" type="datetimeFigureOut">
               <a:rPr lang="en-US" smtClean="0"/>
-              <a:t>4/23/2020</a:t>
+              <a:t>4/24/2020</a:t>
             </a:fld>
             <a:endParaRPr lang="en-US"/>
           </a:p>
@@ -1311,7 +1395,7 @@
           <a:p>
             <a:fld id="{69F42ADB-7D30-4CDA-A166-333DE990463F}" type="datetimeFigureOut">
               <a:rPr lang="en-US" smtClean="0"/>
-              <a:t>4/23/2020</a:t>
+              <a:t>4/24/2020</a:t>
             </a:fld>
             <a:endParaRPr lang="en-US"/>
           </a:p>
@@ -1800,7 +1884,7 @@
           <a:p>
             <a:fld id="{69F42ADB-7D30-4CDA-A166-333DE990463F}" type="datetimeFigureOut">
               <a:rPr lang="en-US" smtClean="0"/>
-              <a:t>4/23/2020</a:t>
+              <a:t>4/24/2020</a:t>
             </a:fld>
             <a:endParaRPr lang="en-US"/>
           </a:p>
@@ -1917,7 +2001,7 @@
           <a:p>
             <a:fld id="{69F42ADB-7D30-4CDA-A166-333DE990463F}" type="datetimeFigureOut">
               <a:rPr lang="en-US" smtClean="0"/>
-              <a:t>4/23/2020</a:t>
+              <a:t>4/24/2020</a:t>
             </a:fld>
             <a:endParaRPr lang="en-US"/>
           </a:p>
@@ -2255,7 +2339,7 @@
           <a:p>
             <a:fld id="{69F42ADB-7D30-4CDA-A166-333DE990463F}" type="datetimeFigureOut">
               <a:rPr lang="en-US" smtClean="0"/>
-              <a:t>4/23/2020</a:t>
+              <a:t>4/24/2020</a:t>
             </a:fld>
             <a:endParaRPr lang="en-US"/>
           </a:p>
@@ -2507,7 +2591,7 @@
           <a:p>
             <a:fld id="{69F42ADB-7D30-4CDA-A166-333DE990463F}" type="datetimeFigureOut">
               <a:rPr lang="en-US" smtClean="0"/>
-              <a:t>4/23/2020</a:t>
+              <a:t>4/24/2020</a:t>
             </a:fld>
             <a:endParaRPr lang="en-US"/>
           </a:p>
@@ -2675,7 +2759,7 @@
           <a:p>
             <a:fld id="{69F42ADB-7D30-4CDA-A166-333DE990463F}" type="datetimeFigureOut">
               <a:rPr lang="en-US" smtClean="0"/>
-              <a:t>4/23/2020</a:t>
+              <a:t>4/24/2020</a:t>
             </a:fld>
             <a:endParaRPr lang="en-US"/>
           </a:p>
@@ -2853,7 +2937,7 @@
           <a:p>
             <a:fld id="{69F42ADB-7D30-4CDA-A166-333DE990463F}" type="datetimeFigureOut">
               <a:rPr lang="en-US" smtClean="0"/>
-              <a:t>4/23/2020</a:t>
+              <a:t>4/24/2020</a:t>
             </a:fld>
             <a:endParaRPr lang="en-US"/>
           </a:p>
@@ -3067,7 +3151,7 @@
           <a:p>
             <a:fld id="{69F42ADB-7D30-4CDA-A166-333DE990463F}" type="datetimeFigureOut">
               <a:rPr lang="en-US" smtClean="0"/>
-              <a:t>4/23/2020</a:t>
+              <a:t>4/24/2020</a:t>
             </a:fld>
             <a:endParaRPr lang="en-US"/>
           </a:p>
@@ -4036,7 +4120,7 @@
           </p:nvPr>
         </p:nvPicPr>
         <p:blipFill>
-          <a:blip r:embed="rId2"/>
+          <a:blip r:embed="rId3"/>
           <a:stretch>
             <a:fillRect/>
           </a:stretch>
@@ -4044,13 +4128,53 @@
         <p:spPr>
           <a:xfrm>
             <a:off x="807229" y="1200150"/>
-            <a:ext cx="7529541" cy="3394075"/>
+            <a:ext cx="7529541" cy="2954161"/>
           </a:xfrm>
           <a:prstGeom prst="rect">
             <a:avLst/>
           </a:prstGeom>
         </p:spPr>
       </p:pic>
+      <p:sp>
+        <p:nvSpPr>
+          <p:cNvPr id="5" name="TextBox 4">
+            <a:extLst>
+              <a:ext uri="{FF2B5EF4-FFF2-40B4-BE49-F238E27FC236}">
+                <a16:creationId xmlns:a16="http://schemas.microsoft.com/office/drawing/2014/main" id="{2949C236-81E9-41CE-80B7-39839155E948}"/>
+              </a:ext>
+            </a:extLst>
+          </p:cNvPr>
+          <p:cNvSpPr txBox="1"/>
+          <p:nvPr/>
+        </p:nvSpPr>
+        <p:spPr>
+          <a:xfrm>
+            <a:off x="807229" y="4291190"/>
+            <a:ext cx="7444949" cy="646331"/>
+          </a:xfrm>
+          <a:prstGeom prst="rect">
+            <a:avLst/>
+          </a:prstGeom>
+          <a:noFill/>
+        </p:spPr>
+        <p:txBody>
+          <a:bodyPr wrap="square" rtlCol="0">
+            <a:spAutoFit/>
+          </a:bodyPr>
+          <a:lstStyle/>
+          <a:p>
+            <a:pPr marL="285750" indent="-285750">
+              <a:buFont typeface="Arial" panose="020B0604020202020204" pitchFamily="34" charset="0"/>
+              <a:buChar char="•"/>
+            </a:pPr>
+            <a:r>
+              <a:rPr lang="en-US" dirty="0"/>
+              <a:t>Try with a different country and add another select statement at the end to only show active cases </a:t>
+            </a:r>
+            <a:endParaRPr lang="en-GB" dirty="0"/>
+          </a:p>
+        </p:txBody>
+      </p:sp>
     </p:spTree>
     <p:extLst>
       <p:ext uri="{BB962C8B-B14F-4D97-AF65-F5344CB8AC3E}">
@@ -4158,27 +4282,42 @@
               <a:rPr lang="en-GB" sz="2400" dirty="0"/>
               <a:t>Compute table of summaries.</a:t>
             </a:r>
-          </a:p>
-          <a:p>
-            <a:r>
+            <a:br>
               <a:rPr lang="en-GB" sz="2400" dirty="0"/>
-              <a:t>summarise(</a:t>
+            </a:br>
+            <a:r>
+              <a:rPr lang="en-GB" sz="2400" dirty="0"/>
+              <a:t>e.g. summarise(mpg, mean(</a:t>
             </a:r>
             <a:r>
               <a:rPr lang="en-GB" sz="2400" dirty="0" err="1"/>
-              <a:t>mtcars</a:t>
+              <a:t>cty</a:t>
             </a:r>
             <a:r>
               <a:rPr lang="en-GB" sz="2400" dirty="0"/>
-              <a:t>, </a:t>
+              <a:t>))</a:t>
+            </a:r>
+          </a:p>
+          <a:p>
+            <a:r>
+              <a:rPr lang="en-GB" sz="2400" dirty="0"/>
+              <a:t>Name the summary variable by using summarise(mpg, </a:t>
             </a:r>
             <a:r>
               <a:rPr lang="en-GB" sz="2400" dirty="0" err="1"/>
-              <a:t>avg</a:t>
+              <a:t>mean_cty</a:t>
             </a:r>
             <a:r>
               <a:rPr lang="en-GB" sz="2400" dirty="0"/>
-              <a:t> = mean(mpg))</a:t>
+              <a:t> = mean(</a:t>
+            </a:r>
+            <a:r>
+              <a:rPr lang="en-GB" sz="2400" dirty="0" err="1"/>
+              <a:t>cty</a:t>
+            </a:r>
+            <a:r>
+              <a:rPr lang="en-GB" sz="2400" dirty="0"/>
+              <a:t>))</a:t>
             </a:r>
           </a:p>
         </p:txBody>
@@ -4290,13 +4429,13 @@
         </p:nvSpPr>
         <p:spPr>
           <a:xfrm>
-            <a:off x="457200" y="1200151"/>
-            <a:ext cx="4476044" cy="3394472"/>
+            <a:off x="457200" y="1200150"/>
+            <a:ext cx="4476044" cy="3597627"/>
           </a:xfrm>
         </p:spPr>
         <p:txBody>
           <a:bodyPr>
-            <a:normAutofit lnSpcReduction="10000"/>
+            <a:normAutofit fontScale="92500" lnSpcReduction="20000"/>
           </a:bodyPr>
           <a:lstStyle/>
           <a:p>
@@ -4332,7 +4471,7 @@
             </a:r>
             <a:r>
               <a:rPr lang="en-GB" sz="2400" dirty="0" err="1"/>
-              <a:t>cyl</a:t>
+              <a:t>drv</a:t>
             </a:r>
             <a:r>
               <a:rPr lang="en-GB" sz="2400" dirty="0"/>
@@ -4351,17 +4490,33 @@
             </a:r>
             <a:r>
               <a:rPr lang="en-GB" sz="2400" dirty="0"/>
-              <a:t> = mean(mpg))</a:t>
-            </a:r>
-          </a:p>
-          <a:p>
+              <a:t> = mean(</a:t>
+            </a:r>
+            <a:r>
+              <a:rPr lang="en-GB" sz="2400" dirty="0" err="1"/>
+              <a:t>cty</a:t>
+            </a:r>
             <a:r>
               <a:rPr lang="en-GB" sz="2400" dirty="0"/>
-              <a:t>Can also group by more than one column</a:t>
-            </a:r>
-          </a:p>
-          <a:p>
-            <a:endParaRPr lang="en-GB" dirty="0"/>
+              <a:t>))</a:t>
+            </a:r>
+          </a:p>
+          <a:p>
+            <a:r>
+              <a:rPr lang="en-GB" sz="2400" dirty="0"/>
+              <a:t>Can also group by more than one column: get all unique combinations</a:t>
+            </a:r>
+            <a:br>
+              <a:rPr lang="en-GB" sz="2400" dirty="0"/>
+            </a:br>
+            <a:r>
+              <a:rPr lang="en-GB" sz="2400" dirty="0" err="1"/>
+              <a:t>group_by</a:t>
+            </a:r>
+            <a:r>
+              <a:rPr lang="en-GB" sz="2400" dirty="0"/>
+              <a:t>(mpg, manufacturer, year)</a:t>
+            </a:r>
           </a:p>
         </p:txBody>
       </p:sp>
@@ -4475,16 +4630,16 @@
           <a:bodyPr/>
           <a:lstStyle/>
           <a:p>
-            <a:endParaRPr lang="en-GB"/>
+            <a:endParaRPr lang="en-GB" dirty="0"/>
           </a:p>
         </p:txBody>
       </p:sp>
       <p:pic>
         <p:nvPicPr>
-          <p:cNvPr id="7" name="Picture 6">
+          <p:cNvPr id="8" name="Picture 7">
             <a:extLst>
               <a:ext uri="{FF2B5EF4-FFF2-40B4-BE49-F238E27FC236}">
-                <a16:creationId xmlns:a16="http://schemas.microsoft.com/office/drawing/2014/main" id="{C0DE36F6-44B4-4CF5-AC59-435C12D0460D}"/>
+                <a16:creationId xmlns:a16="http://schemas.microsoft.com/office/drawing/2014/main" id="{E82C8BE5-BF13-4E2F-B078-78FA52B842C0}"/>
               </a:ext>
             </a:extLst>
           </p:cNvPr>
@@ -4501,14 +4656,72 @@
         </p:blipFill>
         <p:spPr>
           <a:xfrm>
-            <a:off x="553156" y="1200151"/>
-            <a:ext cx="7885289" cy="1478492"/>
+            <a:off x="496711" y="1205974"/>
+            <a:ext cx="7817556" cy="1691413"/>
           </a:xfrm>
           <a:prstGeom prst="rect">
             <a:avLst/>
           </a:prstGeom>
         </p:spPr>
       </p:pic>
+      <p:sp>
+        <p:nvSpPr>
+          <p:cNvPr id="9" name="TextBox 8">
+            <a:extLst>
+              <a:ext uri="{FF2B5EF4-FFF2-40B4-BE49-F238E27FC236}">
+                <a16:creationId xmlns:a16="http://schemas.microsoft.com/office/drawing/2014/main" id="{709978B2-97D7-4B80-9534-05104E56BB4E}"/>
+              </a:ext>
+            </a:extLst>
+          </p:cNvPr>
+          <p:cNvSpPr txBox="1"/>
+          <p:nvPr/>
+        </p:nvSpPr>
+        <p:spPr>
+          <a:xfrm>
+            <a:off x="581378" y="2952044"/>
+            <a:ext cx="7505773" cy="646331"/>
+          </a:xfrm>
+          <a:prstGeom prst="rect">
+            <a:avLst/>
+          </a:prstGeom>
+          <a:noFill/>
+        </p:spPr>
+        <p:txBody>
+          <a:bodyPr wrap="none" rtlCol="0">
+            <a:spAutoFit/>
+          </a:bodyPr>
+          <a:lstStyle/>
+          <a:p>
+            <a:pPr marL="285750" indent="-285750">
+              <a:buFont typeface="Arial" panose="020B0604020202020204" pitchFamily="34" charset="0"/>
+              <a:buChar char="•"/>
+            </a:pPr>
+            <a:r>
+              <a:rPr lang="en-US" dirty="0"/>
+              <a:t>What happens if you don’t use the ignore.na = T in the </a:t>
+            </a:r>
+            <a:r>
+              <a:rPr lang="en-US" dirty="0" err="1"/>
+              <a:t>summarise</a:t>
+            </a:r>
+            <a:r>
+              <a:rPr lang="en-US" dirty="0"/>
+              <a:t> function</a:t>
+            </a:r>
+          </a:p>
+          <a:p>
+            <a:pPr marL="285750" indent="-285750">
+              <a:buFont typeface="Arial" panose="020B0604020202020204" pitchFamily="34" charset="0"/>
+              <a:buChar char="•"/>
+            </a:pPr>
+            <a:r>
+              <a:rPr lang="en-US" dirty="0"/>
+              <a:t>Try with a different demographic</a:t>
+            </a:r>
+            <a:endParaRPr lang="en-GB" dirty="0"/>
+          </a:p>
+        </p:txBody>
+      </p:sp>
     </p:spTree>
     <p:extLst>
       <p:ext uri="{BB962C8B-B14F-4D97-AF65-F5344CB8AC3E}">
@@ -5371,6 +5584,45 @@
           </a:prstGeom>
         </p:spPr>
       </p:pic>
+      <p:sp>
+        <p:nvSpPr>
+          <p:cNvPr id="5" name="Rectangle 4">
+            <a:extLst>
+              <a:ext uri="{FF2B5EF4-FFF2-40B4-BE49-F238E27FC236}">
+                <a16:creationId xmlns:a16="http://schemas.microsoft.com/office/drawing/2014/main" id="{0DF9E326-2311-40D2-8230-20A3A9EF2908}"/>
+              </a:ext>
+            </a:extLst>
+          </p:cNvPr>
+          <p:cNvSpPr/>
+          <p:nvPr/>
+        </p:nvSpPr>
+        <p:spPr>
+          <a:xfrm>
+            <a:off x="722488" y="3220135"/>
+            <a:ext cx="7964312" cy="646331"/>
+          </a:xfrm>
+          <a:prstGeom prst="rect">
+            <a:avLst/>
+          </a:prstGeom>
+        </p:spPr>
+        <p:txBody>
+          <a:bodyPr wrap="square">
+            <a:spAutoFit/>
+          </a:bodyPr>
+          <a:lstStyle/>
+          <a:p>
+            <a:pPr marL="285750" indent="-285750">
+              <a:buFont typeface="Arial" panose="020B0604020202020204" pitchFamily="34" charset="0"/>
+              <a:buChar char="•"/>
+            </a:pPr>
+            <a:r>
+              <a:rPr lang="en-US" dirty="0"/>
+              <a:t>add another select statement at the end to only show active cases  and recovered  </a:t>
+            </a:r>
+            <a:endParaRPr lang="en-GB" dirty="0"/>
+          </a:p>
+        </p:txBody>
+      </p:sp>
     </p:spTree>
     <p:extLst>
       <p:ext uri="{BB962C8B-B14F-4D97-AF65-F5344CB8AC3E}">
@@ -6507,7 +6759,7 @@
             </a:r>
             <a:r>
               <a:rPr lang="en-GB" sz="1800" dirty="0"/>
-              <a:t>(data, 1999:2000, </a:t>
+              <a:t>(data, `1999`:`2000`, </a:t>
             </a:r>
             <a:r>
               <a:rPr lang="en-GB" sz="1800" dirty="0" err="1"/>
@@ -7533,97 +7785,6 @@
           <p:cNvPr id="2" name="Title 1">
             <a:extLst>
               <a:ext uri="{FF2B5EF4-FFF2-40B4-BE49-F238E27FC236}">
-                <a16:creationId xmlns:a16="http://schemas.microsoft.com/office/drawing/2014/main" id="{D7269086-372B-4D96-89A6-0283E0150F45}"/>
-              </a:ext>
-            </a:extLst>
-          </p:cNvPr>
-          <p:cNvSpPr>
-            <a:spLocks noGrp="1"/>
-          </p:cNvSpPr>
-          <p:nvPr>
-            <p:ph type="title"/>
-          </p:nvPr>
-        </p:nvSpPr>
-        <p:spPr/>
-        <p:txBody>
-          <a:bodyPr/>
-          <a:lstStyle/>
-          <a:p>
-            <a:r>
-              <a:rPr lang="en-US" dirty="0"/>
-              <a:t>Let’s program</a:t>
-            </a:r>
-            <a:endParaRPr lang="en-GB" dirty="0"/>
-          </a:p>
-        </p:txBody>
-      </p:sp>
-      <p:pic>
-        <p:nvPicPr>
-          <p:cNvPr id="4" name="Content Placeholder 3">
-            <a:extLst>
-              <a:ext uri="{FF2B5EF4-FFF2-40B4-BE49-F238E27FC236}">
-                <a16:creationId xmlns:a16="http://schemas.microsoft.com/office/drawing/2014/main" id="{70EC59BC-A354-4B20-AB26-143DDB86B835}"/>
-              </a:ext>
-            </a:extLst>
-          </p:cNvPr>
-          <p:cNvPicPr>
-            <a:picLocks noGrp="1" noChangeAspect="1"/>
-          </p:cNvPicPr>
-          <p:nvPr>
-            <p:ph idx="1"/>
-          </p:nvPr>
-        </p:nvPicPr>
-        <p:blipFill>
-          <a:blip r:embed="rId2"/>
-          <a:stretch>
-            <a:fillRect/>
-          </a:stretch>
-        </p:blipFill>
-        <p:spPr>
-          <a:xfrm>
-            <a:off x="536222" y="1222423"/>
-            <a:ext cx="8229600" cy="2852818"/>
-          </a:xfrm>
-          <a:prstGeom prst="rect">
-            <a:avLst/>
-          </a:prstGeom>
-        </p:spPr>
-      </p:pic>
-    </p:spTree>
-    <p:extLst>
-      <p:ext uri="{BB962C8B-B14F-4D97-AF65-F5344CB8AC3E}">
-        <p14:creationId xmlns:p14="http://schemas.microsoft.com/office/powerpoint/2010/main" val="2443207877"/>
-      </p:ext>
-    </p:extLst>
-  </p:cSld>
-  <p:clrMapOvr>
-    <a:masterClrMapping/>
-  </p:clrMapOvr>
-</p:sld>
-</file>
-
-<file path=ppt/slides/slide23.xml><?xml version="1.0" encoding="utf-8"?>
-<p:sld xmlns:a="http://schemas.openxmlformats.org/drawingml/2006/main" xmlns:r="http://schemas.openxmlformats.org/officeDocument/2006/relationships" xmlns:p="http://schemas.openxmlformats.org/presentationml/2006/main">
-  <p:cSld>
-    <p:spTree>
-      <p:nvGrpSpPr>
-        <p:cNvPr id="1" name=""/>
-        <p:cNvGrpSpPr/>
-        <p:nvPr/>
-      </p:nvGrpSpPr>
-      <p:grpSpPr>
-        <a:xfrm>
-          <a:off x="0" y="0"/>
-          <a:ext cx="0" cy="0"/>
-          <a:chOff x="0" y="0"/>
-          <a:chExt cx="0" cy="0"/>
-        </a:xfrm>
-      </p:grpSpPr>
-      <p:sp>
-        <p:nvSpPr>
-          <p:cNvPr id="2" name="Title 1">
-            <a:extLst>
-              <a:ext uri="{FF2B5EF4-FFF2-40B4-BE49-F238E27FC236}">
                 <a16:creationId xmlns:a16="http://schemas.microsoft.com/office/drawing/2014/main" id="{6055D8B7-DBA4-4929-8A10-AC1DAB881362}"/>
               </a:ext>
             </a:extLst>
@@ -7891,6 +8052,176 @@
 </p:sld>
 </file>
 
+<file path=ppt/slides/slide23.xml><?xml version="1.0" encoding="utf-8"?>
+<p:sld xmlns:a="http://schemas.openxmlformats.org/drawingml/2006/main" xmlns:r="http://schemas.openxmlformats.org/officeDocument/2006/relationships" xmlns:p="http://schemas.openxmlformats.org/presentationml/2006/main">
+  <p:cSld>
+    <p:spTree>
+      <p:nvGrpSpPr>
+        <p:cNvPr id="1" name=""/>
+        <p:cNvGrpSpPr/>
+        <p:nvPr/>
+      </p:nvGrpSpPr>
+      <p:grpSpPr>
+        <a:xfrm>
+          <a:off x="0" y="0"/>
+          <a:ext cx="0" cy="0"/>
+          <a:chOff x="0" y="0"/>
+          <a:chExt cx="0" cy="0"/>
+        </a:xfrm>
+      </p:grpSpPr>
+      <p:sp>
+        <p:nvSpPr>
+          <p:cNvPr id="2" name="Title 1">
+            <a:extLst>
+              <a:ext uri="{FF2B5EF4-FFF2-40B4-BE49-F238E27FC236}">
+                <a16:creationId xmlns:a16="http://schemas.microsoft.com/office/drawing/2014/main" id="{D7269086-372B-4D96-89A6-0283E0150F45}"/>
+              </a:ext>
+            </a:extLst>
+          </p:cNvPr>
+          <p:cNvSpPr>
+            <a:spLocks noGrp="1"/>
+          </p:cNvSpPr>
+          <p:nvPr>
+            <p:ph type="title"/>
+          </p:nvPr>
+        </p:nvSpPr>
+        <p:spPr/>
+        <p:txBody>
+          <a:bodyPr/>
+          <a:lstStyle/>
+          <a:p>
+            <a:r>
+              <a:rPr lang="en-US" dirty="0"/>
+              <a:t>Let’s program</a:t>
+            </a:r>
+            <a:endParaRPr lang="en-GB" dirty="0"/>
+          </a:p>
+        </p:txBody>
+      </p:sp>
+      <p:sp>
+        <p:nvSpPr>
+          <p:cNvPr id="6" name="Content Placeholder 5">
+            <a:extLst>
+              <a:ext uri="{FF2B5EF4-FFF2-40B4-BE49-F238E27FC236}">
+                <a16:creationId xmlns:a16="http://schemas.microsoft.com/office/drawing/2014/main" id="{C550C665-6ADF-4AA8-90DA-3A710106DEB6}"/>
+              </a:ext>
+            </a:extLst>
+          </p:cNvPr>
+          <p:cNvSpPr>
+            <a:spLocks noGrp="1"/>
+          </p:cNvSpPr>
+          <p:nvPr>
+            <p:ph idx="1"/>
+          </p:nvPr>
+        </p:nvSpPr>
+        <p:spPr/>
+        <p:txBody>
+          <a:bodyPr/>
+          <a:lstStyle/>
+          <a:p>
+            <a:endParaRPr lang="en-GB" dirty="0"/>
+          </a:p>
+        </p:txBody>
+      </p:sp>
+      <p:pic>
+        <p:nvPicPr>
+          <p:cNvPr id="7" name="Picture 6">
+            <a:extLst>
+              <a:ext uri="{FF2B5EF4-FFF2-40B4-BE49-F238E27FC236}">
+                <a16:creationId xmlns:a16="http://schemas.microsoft.com/office/drawing/2014/main" id="{2BAF3235-086B-499F-BA04-559084DCF0DB}"/>
+              </a:ext>
+            </a:extLst>
+          </p:cNvPr>
+          <p:cNvPicPr>
+            <a:picLocks noChangeAspect="1"/>
+          </p:cNvPicPr>
+          <p:nvPr/>
+        </p:nvPicPr>
+        <p:blipFill>
+          <a:blip r:embed="rId2"/>
+          <a:stretch>
+            <a:fillRect/>
+          </a:stretch>
+        </p:blipFill>
+        <p:spPr>
+          <a:xfrm>
+            <a:off x="482600" y="1242153"/>
+            <a:ext cx="8178800" cy="3310467"/>
+          </a:xfrm>
+          <a:prstGeom prst="rect">
+            <a:avLst/>
+          </a:prstGeom>
+        </p:spPr>
+      </p:pic>
+      <p:sp>
+        <p:nvSpPr>
+          <p:cNvPr id="8" name="TextBox 7">
+            <a:extLst>
+              <a:ext uri="{FF2B5EF4-FFF2-40B4-BE49-F238E27FC236}">
+                <a16:creationId xmlns:a16="http://schemas.microsoft.com/office/drawing/2014/main" id="{8DF7309D-0A33-4A70-8656-B7ED9442944B}"/>
+              </a:ext>
+            </a:extLst>
+          </p:cNvPr>
+          <p:cNvSpPr txBox="1"/>
+          <p:nvPr/>
+        </p:nvSpPr>
+        <p:spPr>
+          <a:xfrm>
+            <a:off x="592669" y="4487336"/>
+            <a:ext cx="5499454" cy="369332"/>
+          </a:xfrm>
+          <a:prstGeom prst="rect">
+            <a:avLst/>
+          </a:prstGeom>
+          <a:noFill/>
+        </p:spPr>
+        <p:txBody>
+          <a:bodyPr wrap="none" rtlCol="0">
+            <a:spAutoFit/>
+          </a:bodyPr>
+          <a:lstStyle/>
+          <a:p>
+            <a:pPr marL="285750" indent="-285750">
+              <a:buFont typeface="Arial" panose="020B0604020202020204" pitchFamily="34" charset="0"/>
+              <a:buChar char="•"/>
+            </a:pPr>
+            <a:r>
+              <a:rPr lang="en-US" dirty="0"/>
+              <a:t>What happens if we replace </a:t>
+            </a:r>
+            <a:r>
+              <a:rPr lang="en-US" dirty="0" err="1"/>
+              <a:t>inner_join</a:t>
+            </a:r>
+            <a:r>
+              <a:rPr lang="en-US" dirty="0"/>
+              <a:t> with </a:t>
+            </a:r>
+            <a:r>
+              <a:rPr lang="en-US" dirty="0" err="1"/>
+              <a:t>full_join</a:t>
+            </a:r>
+            <a:r>
+              <a:rPr lang="en-US" dirty="0"/>
+              <a:t>?</a:t>
+            </a:r>
+            <a:endParaRPr lang="en-GB" dirty="0"/>
+          </a:p>
+        </p:txBody>
+      </p:sp>
+    </p:spTree>
+    <p:extLst>
+      <p:ext uri="{BB962C8B-B14F-4D97-AF65-F5344CB8AC3E}">
+        <p14:creationId xmlns:p14="http://schemas.microsoft.com/office/powerpoint/2010/main" val="3818772873"/>
+      </p:ext>
+    </p:extLst>
+  </p:cSld>
+  <p:clrMapOvr>
+    <a:masterClrMapping/>
+  </p:clrMapOvr>
+</p:sld>
+</file>
+
 <file path=ppt/slides/slide24.xml><?xml version="1.0" encoding="utf-8"?>
 <p:sld xmlns:a="http://schemas.openxmlformats.org/drawingml/2006/main" xmlns:r="http://schemas.openxmlformats.org/officeDocument/2006/relationships" xmlns:p="http://schemas.openxmlformats.org/presentationml/2006/main">
   <p:cSld>
@@ -8800,7 +9131,12 @@
             <p:ph idx="1"/>
           </p:nvPr>
         </p:nvSpPr>
-        <p:spPr/>
+        <p:spPr>
+          <a:xfrm>
+            <a:off x="457200" y="1200151"/>
+            <a:ext cx="4797778" cy="3394472"/>
+          </a:xfrm>
+        </p:spPr>
         <p:txBody>
           <a:bodyPr>
             <a:normAutofit/>
@@ -8827,11 +9163,60 @@
           <a:p>
             <a:r>
               <a:rPr lang="en-US" sz="2400" dirty="0"/>
-              <a:t>Cheat sheet https://raw.githubusercontent.com/rstudio/cheatsheets/master/data-transformation.pdf</a:t>
-            </a:r>
-          </a:p>
-        </p:txBody>
-      </p:sp>
+              <a:t>Cheat sheets for </a:t>
+            </a:r>
+            <a:r>
+              <a:rPr lang="en-US" sz="2400" dirty="0" err="1"/>
+              <a:t>tidyr</a:t>
+            </a:r>
+            <a:r>
+              <a:rPr lang="en-US" sz="2400" dirty="0"/>
+              <a:t>, </a:t>
+            </a:r>
+            <a:r>
+              <a:rPr lang="en-US" sz="2400" dirty="0" err="1"/>
+              <a:t>dplyr</a:t>
+            </a:r>
+            <a:r>
+              <a:rPr lang="en-US" sz="2400" dirty="0"/>
+              <a:t>, ggplot2 and many more</a:t>
+            </a:r>
+          </a:p>
+          <a:p>
+            <a:endParaRPr lang="en-US" sz="2400" dirty="0"/>
+          </a:p>
+        </p:txBody>
+      </p:sp>
+      <p:pic>
+        <p:nvPicPr>
+          <p:cNvPr id="4" name="Picture 3">
+            <a:extLst>
+              <a:ext uri="{FF2B5EF4-FFF2-40B4-BE49-F238E27FC236}">
+                <a16:creationId xmlns:a16="http://schemas.microsoft.com/office/drawing/2014/main" id="{067667FA-3389-4FC1-94B9-167994124585}"/>
+              </a:ext>
+            </a:extLst>
+          </p:cNvPr>
+          <p:cNvPicPr>
+            <a:picLocks noChangeAspect="1"/>
+          </p:cNvPicPr>
+          <p:nvPr/>
+        </p:nvPicPr>
+        <p:blipFill>
+          <a:blip r:embed="rId2"/>
+          <a:stretch>
+            <a:fillRect/>
+          </a:stretch>
+        </p:blipFill>
+        <p:spPr>
+          <a:xfrm>
+            <a:off x="5443470" y="1082222"/>
+            <a:ext cx="2482813" cy="3630330"/>
+          </a:xfrm>
+          <a:prstGeom prst="rect">
+            <a:avLst/>
+          </a:prstGeom>
+        </p:spPr>
+      </p:pic>
     </p:spTree>
     <p:extLst>
       <p:ext uri="{BB962C8B-B14F-4D97-AF65-F5344CB8AC3E}">
@@ -9024,20 +9409,8 @@
               <a:t>memPotDT</a:t>
             </a:r>
             <a:r>
-              <a:rPr lang="en-GB" sz="1800"/>
-              <a:t>[, mean</a:t>
-            </a:r>
-            <a:r>
               <a:rPr lang="en-GB" sz="1800" dirty="0"/>
-              <a:t>(</a:t>
-            </a:r>
-            <a:r>
-              <a:rPr lang="en-GB" sz="1800"/>
-              <a:t>Measurement1), </a:t>
-            </a:r>
-            <a:r>
-              <a:rPr lang="en-GB" sz="1800" dirty="0"/>
-              <a:t>by = .(</a:t>
+              <a:t>[, mean(Measurement1), by = .(</a:t>
             </a:r>
             <a:r>
               <a:rPr lang="en-GB" sz="1800" dirty="0" err="1"/>
@@ -9765,17 +10138,33 @@
             </a:r>
             <a:r>
               <a:rPr lang="en-GB" sz="2400" dirty="0" err="1"/>
-              <a:t>gpm</a:t>
+              <a:t>cty_cyl</a:t>
             </a:r>
             <a:r>
               <a:rPr lang="en-GB" sz="2400" dirty="0"/>
-              <a:t> = 1/mpg)</a:t>
-            </a:r>
-          </a:p>
-          <a:p>
+              <a:t> = </a:t>
+            </a:r>
+            <a:r>
+              <a:rPr lang="en-GB" sz="2400" dirty="0" err="1"/>
+              <a:t>cty</a:t>
+            </a:r>
             <a:r>
               <a:rPr lang="en-GB" sz="2400" dirty="0"/>
-              <a:t>Is based on existing fields in the data frame</a:t>
+              <a:t>/</a:t>
+            </a:r>
+            <a:r>
+              <a:rPr lang="en-GB" sz="2400" dirty="0" err="1"/>
+              <a:t>cyl</a:t>
+            </a:r>
+            <a:r>
+              <a:rPr lang="en-GB" sz="2400" dirty="0"/>
+              <a:t>)</a:t>
+            </a:r>
+          </a:p>
+          <a:p>
+            <a:r>
+              <a:rPr lang="en-GB" sz="2400" dirty="0"/>
+              <a:t>Is based on existing fields in the data table</a:t>
             </a:r>
           </a:p>
           <a:p>
@@ -9788,15 +10177,23 @@
             </a:br>
             <a:r>
               <a:rPr lang="en-GB" sz="2400" dirty="0"/>
-              <a:t>mutate(</a:t>
+              <a:t>mutate(mpg, </a:t>
             </a:r>
             <a:r>
               <a:rPr lang="en-GB" sz="2400" dirty="0" err="1"/>
-              <a:t>mtcars</a:t>
+              <a:t>cty</a:t>
             </a:r>
             <a:r>
               <a:rPr lang="en-GB" sz="2400" dirty="0"/>
-              <a:t>, mpg = mpg/1.7)</a:t>
+              <a:t> = </a:t>
+            </a:r>
+            <a:r>
+              <a:rPr lang="en-GB" sz="2400" dirty="0" err="1"/>
+              <a:t>cty</a:t>
+            </a:r>
+            <a:r>
+              <a:rPr lang="en-GB" sz="2400" dirty="0"/>
+              <a:t>/1.7)</a:t>
             </a:r>
           </a:p>
         </p:txBody>

</xml_diff>